<commit_message>
Actualizando Seccion 4 Diapos
</commit_message>
<xml_diff>
--- a/Seccion 4 Inferencia/Diapositivas/4.6 Contraste para la media de una Normal multivariante.pptx
+++ b/Seccion 4 Inferencia/Diapositivas/4.6 Contraste para la media de una Normal multivariante.pptx
@@ -211,7 +211,7 @@
           <a:p>
             <a:fld id="{FDD9119D-E0DF-44A0-868D-99C21E45606E}" type="datetimeFigureOut">
               <a:rPr lang="es-ES" smtClean="0"/>
-              <a:t>15/01/2020</a:t>
+              <a:t>03/04/2020</a:t>
             </a:fld>
             <a:endParaRPr lang="es-ES"/>
           </a:p>
@@ -626,7 +626,7 @@
             <a:fld id="{B61BEF0D-F0BB-DE4B-95CE-6DB70DBA9567}" type="datetimeFigureOut">
               <a:rPr lang="en-US" smtClean="0"/>
               <a:pPr/>
-              <a:t>1/15/2020</a:t>
+              <a:t>4/3/2020</a:t>
             </a:fld>
             <a:endParaRPr lang="en-US" dirty="0"/>
           </a:p>
@@ -825,7 +825,7 @@
           <a:p>
             <a:fld id="{55C6B4A9-1611-4792-9094-5F34BCA07E0B}" type="datetimeFigureOut">
               <a:rPr lang="en-US" smtClean="0"/>
-              <a:t>1/15/2020</a:t>
+              <a:t>4/3/2020</a:t>
             </a:fld>
             <a:endParaRPr lang="en-US" dirty="0"/>
           </a:p>
@@ -1034,7 +1034,7 @@
             <a:fld id="{B61BEF0D-F0BB-DE4B-95CE-6DB70DBA9567}" type="datetimeFigureOut">
               <a:rPr lang="en-US" smtClean="0"/>
               <a:pPr/>
-              <a:t>1/15/2020</a:t>
+              <a:t>4/3/2020</a:t>
             </a:fld>
             <a:endParaRPr lang="en-US" dirty="0"/>
           </a:p>
@@ -1854,7 +1854,7 @@
             <a:fld id="{B61BEF0D-F0BB-DE4B-95CE-6DB70DBA9567}" type="datetimeFigureOut">
               <a:rPr lang="en-US" smtClean="0"/>
               <a:pPr/>
-              <a:t>1/15/2020</a:t>
+              <a:t>4/3/2020</a:t>
             </a:fld>
             <a:endParaRPr lang="en-US" dirty="0"/>
           </a:p>
@@ -2026,7 +2026,7 @@
             <a:fld id="{B61BEF0D-F0BB-DE4B-95CE-6DB70DBA9567}" type="datetimeFigureOut">
               <a:rPr lang="en-US" smtClean="0"/>
               <a:pPr/>
-              <a:t>1/15/2020</a:t>
+              <a:t>4/3/2020</a:t>
             </a:fld>
             <a:endParaRPr lang="en-US" dirty="0"/>
           </a:p>
@@ -2275,7 +2275,7 @@
             <a:fld id="{B61BEF0D-F0BB-DE4B-95CE-6DB70DBA9567}" type="datetimeFigureOut">
               <a:rPr lang="en-US" smtClean="0"/>
               <a:pPr/>
-              <a:t>1/15/2020</a:t>
+              <a:t>4/3/2020</a:t>
             </a:fld>
             <a:endParaRPr lang="en-US" dirty="0"/>
           </a:p>
@@ -2508,7 +2508,7 @@
           <a:p>
             <a:fld id="{EB712588-04B1-427B-82EE-E8DB90309F08}" type="datetimeFigureOut">
               <a:rPr lang="en-US" smtClean="0"/>
-              <a:t>1/15/2020</a:t>
+              <a:t>4/3/2020</a:t>
             </a:fld>
             <a:endParaRPr lang="en-US" dirty="0"/>
           </a:p>
@@ -2883,7 +2883,7 @@
             <a:fld id="{B61BEF0D-F0BB-DE4B-95CE-6DB70DBA9567}" type="datetimeFigureOut">
               <a:rPr lang="en-US" smtClean="0"/>
               <a:pPr/>
-              <a:t>1/15/2020</a:t>
+              <a:t>4/3/2020</a:t>
             </a:fld>
             <a:endParaRPr lang="en-US" dirty="0"/>
           </a:p>
@@ -3008,7 +3008,7 @@
             <a:fld id="{B61BEF0D-F0BB-DE4B-95CE-6DB70DBA9567}" type="datetimeFigureOut">
               <a:rPr lang="en-US" smtClean="0"/>
               <a:pPr/>
-              <a:t>1/15/2020</a:t>
+              <a:t>4/3/2020</a:t>
             </a:fld>
             <a:endParaRPr lang="en-US" dirty="0"/>
           </a:p>
@@ -3105,7 +3105,7 @@
             <a:fld id="{B61BEF0D-F0BB-DE4B-95CE-6DB70DBA9567}" type="datetimeFigureOut">
               <a:rPr lang="en-US" smtClean="0"/>
               <a:pPr/>
-              <a:t>1/15/2020</a:t>
+              <a:t>4/3/2020</a:t>
             </a:fld>
             <a:endParaRPr lang="en-US" dirty="0"/>
           </a:p>
@@ -3361,7 +3361,7 @@
           <a:p>
             <a:fld id="{42A54C80-263E-416B-A8E0-580EDEADCBDC}" type="datetimeFigureOut">
               <a:rPr lang="en-US" smtClean="0"/>
-              <a:t>1/15/2020</a:t>
+              <a:t>4/3/2020</a:t>
             </a:fld>
             <a:endParaRPr lang="en-US" dirty="0"/>
           </a:p>
@@ -3548,7 +3548,7 @@
             <a:fld id="{B61BEF0D-F0BB-DE4B-95CE-6DB70DBA9567}" type="datetimeFigureOut">
               <a:rPr lang="en-US" smtClean="0"/>
               <a:pPr/>
-              <a:t>1/15/2020</a:t>
+              <a:t>4/3/2020</a:t>
             </a:fld>
             <a:endParaRPr lang="en-US" dirty="0"/>
           </a:p>
@@ -3868,7 +3868,7 @@
             <a:fld id="{B61BEF0D-F0BB-DE4B-95CE-6DB70DBA9567}" type="datetimeFigureOut">
               <a:rPr lang="en-US" smtClean="0"/>
               <a:pPr/>
-              <a:t>1/15/2020</a:t>
+              <a:t>4/3/2020</a:t>
             </a:fld>
             <a:endParaRPr lang="en-US" dirty="0"/>
           </a:p>
@@ -4078,7 +4078,7 @@
             <a:fld id="{B61BEF0D-F0BB-DE4B-95CE-6DB70DBA9567}" type="datetimeFigureOut">
               <a:rPr lang="en-US" smtClean="0"/>
               <a:pPr/>
-              <a:t>1/15/2020</a:t>
+              <a:t>4/3/2020</a:t>
             </a:fld>
             <a:endParaRPr lang="en-US" dirty="0"/>
           </a:p>
@@ -4394,7 +4394,7 @@
             <a:fld id="{B61BEF0D-F0BB-DE4B-95CE-6DB70DBA9567}" type="datetimeFigureOut">
               <a:rPr lang="en-US" smtClean="0"/>
               <a:pPr/>
-              <a:t>1/15/2020</a:t>
+              <a:t>4/3/2020</a:t>
             </a:fld>
             <a:endParaRPr lang="en-US" dirty="0"/>
           </a:p>
@@ -4729,7 +4729,7 @@
             <a:fld id="{B61BEF0D-F0BB-DE4B-95CE-6DB70DBA9567}" type="datetimeFigureOut">
               <a:rPr lang="en-US" smtClean="0"/>
               <a:pPr/>
-              <a:t>1/15/2020</a:t>
+              <a:t>4/3/2020</a:t>
             </a:fld>
             <a:endParaRPr lang="en-US" dirty="0"/>
           </a:p>
@@ -5045,7 +5045,7 @@
             <a:fld id="{B61BEF0D-F0BB-DE4B-95CE-6DB70DBA9567}" type="datetimeFigureOut">
               <a:rPr lang="en-US" smtClean="0"/>
               <a:pPr/>
-              <a:t>1/15/2020</a:t>
+              <a:t>4/3/2020</a:t>
             </a:fld>
             <a:endParaRPr lang="en-US" dirty="0"/>
           </a:p>
@@ -5440,7 +5440,7 @@
             <a:fld id="{B61BEF0D-F0BB-DE4B-95CE-6DB70DBA9567}" type="datetimeFigureOut">
               <a:rPr lang="en-US" smtClean="0"/>
               <a:pPr/>
-              <a:t>1/15/2020</a:t>
+              <a:t>4/3/2020</a:t>
             </a:fld>
             <a:endParaRPr lang="en-US" dirty="0"/>
           </a:p>
@@ -5611,7 +5611,7 @@
           <a:p>
             <a:fld id="{55C6B4A9-1611-4792-9094-5F34BCA07E0B}" type="datetimeFigureOut">
               <a:rPr lang="en-US" smtClean="0"/>
-              <a:t>1/15/2020</a:t>
+              <a:t>4/3/2020</a:t>
             </a:fld>
             <a:endParaRPr lang="en-US" dirty="0"/>
           </a:p>
@@ -5792,7 +5792,7 @@
             <a:fld id="{B61BEF0D-F0BB-DE4B-95CE-6DB70DBA9567}" type="datetimeFigureOut">
               <a:rPr lang="en-US" smtClean="0"/>
               <a:pPr/>
-              <a:t>1/15/2020</a:t>
+              <a:t>4/3/2020</a:t>
             </a:fld>
             <a:endParaRPr lang="en-US" dirty="0"/>
           </a:p>
@@ -6057,7 +6057,7 @@
             <a:fld id="{B61BEF0D-F0BB-DE4B-95CE-6DB70DBA9567}" type="datetimeFigureOut">
               <a:rPr lang="en-US" smtClean="0"/>
               <a:pPr/>
-              <a:t>1/15/2020</a:t>
+              <a:t>4/3/2020</a:t>
             </a:fld>
             <a:endParaRPr lang="en-US" dirty="0"/>
           </a:p>
@@ -6323,7 +6323,7 @@
           <a:p>
             <a:fld id="{EB712588-04B1-427B-82EE-E8DB90309F08}" type="datetimeFigureOut">
               <a:rPr lang="en-US" smtClean="0"/>
-              <a:t>1/15/2020</a:t>
+              <a:t>4/3/2020</a:t>
             </a:fld>
             <a:endParaRPr lang="en-US" dirty="0"/>
           </a:p>
@@ -6736,7 +6736,7 @@
             <a:fld id="{B61BEF0D-F0BB-DE4B-95CE-6DB70DBA9567}" type="datetimeFigureOut">
               <a:rPr lang="en-US" smtClean="0"/>
               <a:pPr/>
-              <a:t>1/15/2020</a:t>
+              <a:t>4/3/2020</a:t>
             </a:fld>
             <a:endParaRPr lang="en-US" dirty="0"/>
           </a:p>
@@ -6879,7 +6879,7 @@
             <a:fld id="{B61BEF0D-F0BB-DE4B-95CE-6DB70DBA9567}" type="datetimeFigureOut">
               <a:rPr lang="en-US" smtClean="0"/>
               <a:pPr/>
-              <a:t>1/15/2020</a:t>
+              <a:t>4/3/2020</a:t>
             </a:fld>
             <a:endParaRPr lang="en-US" dirty="0"/>
           </a:p>
@@ -6994,7 +6994,7 @@
             <a:fld id="{B61BEF0D-F0BB-DE4B-95CE-6DB70DBA9567}" type="datetimeFigureOut">
               <a:rPr lang="en-US" smtClean="0"/>
               <a:pPr/>
-              <a:t>1/15/2020</a:t>
+              <a:t>4/3/2020</a:t>
             </a:fld>
             <a:endParaRPr lang="en-US" dirty="0"/>
           </a:p>
@@ -7306,7 +7306,7 @@
           <a:p>
             <a:fld id="{42A54C80-263E-416B-A8E0-580EDEADCBDC}" type="datetimeFigureOut">
               <a:rPr lang="en-US" smtClean="0"/>
-              <a:t>1/15/2020</a:t>
+              <a:t>4/3/2020</a:t>
             </a:fld>
             <a:endParaRPr lang="en-US" dirty="0"/>
           </a:p>
@@ -7595,7 +7595,7 @@
             <a:fld id="{B61BEF0D-F0BB-DE4B-95CE-6DB70DBA9567}" type="datetimeFigureOut">
               <a:rPr lang="en-US" smtClean="0"/>
               <a:pPr/>
-              <a:t>1/15/2020</a:t>
+              <a:t>4/3/2020</a:t>
             </a:fld>
             <a:endParaRPr lang="en-US" dirty="0"/>
           </a:p>
@@ -7841,7 +7841,7 @@
             <a:fld id="{B61BEF0D-F0BB-DE4B-95CE-6DB70DBA9567}" type="datetimeFigureOut">
               <a:rPr lang="en-US" smtClean="0"/>
               <a:pPr/>
-              <a:t>1/15/2020</a:t>
+              <a:t>4/3/2020</a:t>
             </a:fld>
             <a:endParaRPr lang="en-US" dirty="0"/>
           </a:p>
@@ -8929,7 +8929,7 @@
             <a:fld id="{B61BEF0D-F0BB-DE4B-95CE-6DB70DBA9567}" type="datetimeFigureOut">
               <a:rPr lang="en-US" smtClean="0"/>
               <a:pPr/>
-              <a:t>1/15/2020</a:t>
+              <a:t>4/3/2020</a:t>
             </a:fld>
             <a:endParaRPr lang="en-US" dirty="0"/>
           </a:p>
@@ -11639,8 +11639,8 @@
           </a:p>
         </p:txBody>
       </p:sp>
-      <mc:AlternateContent xmlns:mc="http://schemas.openxmlformats.org/markup-compatibility/2006" xmlns:a14="http://schemas.microsoft.com/office/drawing/2010/main">
-        <mc:Choice Requires="a14">
+      <mc:AlternateContent xmlns:mc="http://schemas.openxmlformats.org/markup-compatibility/2006">
+        <mc:Choice xmlns:a14="http://schemas.microsoft.com/office/drawing/2010/main" Requires="a14">
           <p:sp>
             <p:nvSpPr>
               <p:cNvPr id="3" name="Marcador de contenido 2">
@@ -11677,7 +11677,47 @@
                     <a:latin typeface="Calibri" panose="020F0502020204030204" pitchFamily="34" charset="0"/>
                     <a:cs typeface="Calibri" panose="020F0502020204030204" pitchFamily="34" charset="0"/>
                   </a:rPr>
-                  <a:t>Supongamos que se ha elegido cierto nivel de significación igual a </a:t>
+                  <a:t>Supongamos que se ha elegido cierto </a:t>
+                </a:r>
+                <a:r>
+                  <a:rPr lang="es-ES" sz="2000" dirty="0">
+                    <a:solidFill>
+                      <a:srgbClr val="FFC000"/>
+                    </a:solidFill>
+                    <a:latin typeface="Calibri" panose="020F0502020204030204" pitchFamily="34" charset="0"/>
+                    <a:cs typeface="Calibri" panose="020F0502020204030204" pitchFamily="34" charset="0"/>
+                  </a:rPr>
+                  <a:t>nivel de significación </a:t>
+                </a:r>
+                <a:r>
+                  <a:rPr lang="el-GR" sz="2000" dirty="0">
+                    <a:solidFill>
+                      <a:srgbClr val="FFC000"/>
+                    </a:solidFill>
+                    <a:latin typeface="Calibri" panose="020F0502020204030204" pitchFamily="34" charset="0"/>
+                    <a:cs typeface="Calibri" panose="020F0502020204030204" pitchFamily="34" charset="0"/>
+                  </a:rPr>
+                  <a:t>α</a:t>
+                </a:r>
+                <a:r>
+                  <a:rPr lang="es-ES" sz="2000" dirty="0">
+                    <a:solidFill>
+                      <a:srgbClr val="FFC000"/>
+                    </a:solidFill>
+                    <a:latin typeface="Calibri" panose="020F0502020204030204" pitchFamily="34" charset="0"/>
+                    <a:cs typeface="Calibri" panose="020F0502020204030204" pitchFamily="34" charset="0"/>
+                  </a:rPr>
+                  <a:t> </a:t>
+                </a:r>
+                <a:r>
+                  <a:rPr lang="es-ES" sz="2000" dirty="0">
+                    <a:solidFill>
+                      <a:schemeClr val="bg1"/>
+                    </a:solidFill>
+                    <a:latin typeface="Calibri" panose="020F0502020204030204" pitchFamily="34" charset="0"/>
+                    <a:cs typeface="Calibri" panose="020F0502020204030204" pitchFamily="34" charset="0"/>
+                  </a:rPr>
+                  <a:t>igual a </a:t>
                 </a:r>
                 <a14:m>
                   <m:oMath xmlns:m="http://schemas.openxmlformats.org/officeDocument/2006/math">
@@ -12204,7 +12244,7 @@
             </p:txBody>
           </p:sp>
         </mc:Choice>
-        <mc:Fallback xmlns="">
+        <mc:Fallback>
           <p:sp>
             <p:nvSpPr>
               <p:cNvPr id="3" name="Marcador de contenido 2">
@@ -12310,8 +12350,8 @@
           </a:p>
         </p:txBody>
       </p:sp>
-      <mc:AlternateContent xmlns:mc="http://schemas.openxmlformats.org/markup-compatibility/2006" xmlns:a14="http://schemas.microsoft.com/office/drawing/2010/main">
-        <mc:Choice Requires="a14">
+      <mc:AlternateContent xmlns:mc="http://schemas.openxmlformats.org/markup-compatibility/2006">
+        <mc:Choice xmlns:a14="http://schemas.microsoft.com/office/drawing/2010/main" Requires="a14">
           <p:sp>
             <p:nvSpPr>
               <p:cNvPr id="3" name="Marcador de contenido 2">
@@ -12368,7 +12408,17 @@
                     <a:latin typeface="Calibri" panose="020F0502020204030204" pitchFamily="34" charset="0"/>
                     <a:cs typeface="Calibri" panose="020F0502020204030204" pitchFamily="34" charset="0"/>
                   </a:rPr>
-                  <a:t>por separado, aparentemente, no hay diferencias significativas entre las medias muestrales y las del proceso bajo control, es decir, no habría evidencia para rechazar </a:t>
+                  <a:t>por separado, aparentemente, no hay diferencias significativas entre las medias muestrales y las del proceso bajo control, es decir, </a:t>
+                </a:r>
+                <a:r>
+                  <a:rPr lang="es-ES" sz="2000" dirty="0">
+                    <a:solidFill>
+                      <a:srgbClr val="FFFF00"/>
+                    </a:solidFill>
+                    <a:latin typeface="Calibri" panose="020F0502020204030204" pitchFamily="34" charset="0"/>
+                    <a:cs typeface="Calibri" panose="020F0502020204030204" pitchFamily="34" charset="0"/>
+                  </a:rPr>
+                  <a:t>no habría evidencia para rechazar </a:t>
                 </a:r>
                 <a14:m>
                   <m:oMath xmlns:m="http://schemas.openxmlformats.org/officeDocument/2006/math">
@@ -12377,7 +12427,7 @@
                         <m:ctrlPr>
                           <a:rPr lang="es-ES" sz="2000" b="0" i="1" dirty="0" smtClean="0">
                             <a:solidFill>
-                              <a:schemeClr val="bg1"/>
+                              <a:srgbClr val="FFFF00"/>
                             </a:solidFill>
                             <a:latin typeface="Cambria Math" panose="02040503050406030204" pitchFamily="18" charset="0"/>
                             <a:cs typeface="Calibri" panose="020F0502020204030204" pitchFamily="34" charset="0"/>
@@ -12388,7 +12438,7 @@
                         <m:r>
                           <a:rPr lang="es-ES" sz="2000" i="1" dirty="0" smtClean="0">
                             <a:solidFill>
-                              <a:schemeClr val="bg1"/>
+                              <a:srgbClr val="FFFF00"/>
                             </a:solidFill>
                             <a:latin typeface="Cambria Math" panose="02040503050406030204" pitchFamily="18" charset="0"/>
                             <a:cs typeface="Calibri" panose="020F0502020204030204" pitchFamily="34" charset="0"/>
@@ -12400,7 +12450,7 @@
                         <m:r>
                           <a:rPr lang="es-ES" sz="2000" i="1" dirty="0" smtClean="0">
                             <a:solidFill>
-                              <a:schemeClr val="bg1"/>
+                              <a:srgbClr val="FFFF00"/>
                             </a:solidFill>
                             <a:latin typeface="Cambria Math" panose="02040503050406030204" pitchFamily="18" charset="0"/>
                             <a:cs typeface="Calibri" panose="020F0502020204030204" pitchFamily="34" charset="0"/>
@@ -12450,7 +12500,17 @@
                     <a:latin typeface="Calibri" panose="020F0502020204030204" pitchFamily="34" charset="0"/>
                     <a:cs typeface="Calibri" panose="020F0502020204030204" pitchFamily="34" charset="0"/>
                   </a:rPr>
-                  <a:t>el contraste multivariante tiene en cuenta las correlaciones</a:t>
+                  <a:t>el contraste multivariante tiene en cuenta las </a:t>
+                </a:r>
+                <a:r>
+                  <a:rPr lang="es-ES" sz="2000" u="sng" dirty="0">
+                    <a:solidFill>
+                      <a:srgbClr val="92D050"/>
+                    </a:solidFill>
+                    <a:latin typeface="Calibri" panose="020F0502020204030204" pitchFamily="34" charset="0"/>
+                    <a:cs typeface="Calibri" panose="020F0502020204030204" pitchFamily="34" charset="0"/>
+                  </a:rPr>
+                  <a:t>correlaciones</a:t>
                 </a:r>
                 <a:r>
                   <a:rPr lang="es-ES" sz="2000" dirty="0">
@@ -12466,7 +12526,7 @@
             </p:txBody>
           </p:sp>
         </mc:Choice>
-        <mc:Fallback xmlns="">
+        <mc:Fallback>
           <p:sp>
             <p:nvSpPr>
               <p:cNvPr id="3" name="Marcador de contenido 2">
@@ -12572,8 +12632,8 @@
           </a:p>
         </p:txBody>
       </p:sp>
-      <mc:AlternateContent xmlns:mc="http://schemas.openxmlformats.org/markup-compatibility/2006" xmlns:a14="http://schemas.microsoft.com/office/drawing/2010/main">
-        <mc:Choice Requires="a14">
+      <mc:AlternateContent xmlns:mc="http://schemas.openxmlformats.org/markup-compatibility/2006">
+        <mc:Choice xmlns:a14="http://schemas.microsoft.com/office/drawing/2010/main" Requires="a14">
           <p:sp>
             <p:nvSpPr>
               <p:cNvPr id="3" name="Marcador de contenido 2">
@@ -12709,10 +12769,30 @@
                                     <a:latin typeface="Cambria Math" panose="02040503050406030204" pitchFamily="18" charset="0"/>
                                     <a:cs typeface="Calibri" panose="020F0502020204030204" pitchFamily="34" charset="0"/>
                                   </a:rPr>
+                                  <m:t>   </m:t>
+                                </m:r>
+                                <m:r>
+                                  <a:rPr lang="es-ES" sz="2000" b="0" i="1" smtClean="0">
+                                    <a:solidFill>
+                                      <a:schemeClr val="bg1"/>
+                                    </a:solidFill>
+                                    <a:latin typeface="Cambria Math" panose="02040503050406030204" pitchFamily="18" charset="0"/>
+                                    <a:cs typeface="Calibri" panose="020F0502020204030204" pitchFamily="34" charset="0"/>
+                                  </a:rPr>
                                   <m:t>1</m:t>
                                 </m:r>
                               </m:e>
                               <m:e>
+                                <m:r>
+                                  <a:rPr lang="es-ES" sz="2000" b="0" i="1" smtClean="0">
+                                    <a:solidFill>
+                                      <a:schemeClr val="bg1"/>
+                                    </a:solidFill>
+                                    <a:latin typeface="Cambria Math" panose="02040503050406030204" pitchFamily="18" charset="0"/>
+                                    <a:cs typeface="Calibri" panose="020F0502020204030204" pitchFamily="34" charset="0"/>
+                                  </a:rPr>
+                                  <m:t>   </m:t>
+                                </m:r>
                                 <m:r>
                                   <a:rPr lang="es-ES" sz="2000" b="0" i="1" smtClean="0">
                                     <a:solidFill>
@@ -12747,10 +12827,30 @@
                                     <a:latin typeface="Cambria Math" panose="02040503050406030204" pitchFamily="18" charset="0"/>
                                     <a:cs typeface="Calibri" panose="020F0502020204030204" pitchFamily="34" charset="0"/>
                                   </a:rPr>
+                                  <m:t>   </m:t>
+                                </m:r>
+                                <m:r>
+                                  <a:rPr lang="es-ES" sz="2000" b="0" i="1" smtClean="0">
+                                    <a:solidFill>
+                                      <a:schemeClr val="bg1"/>
+                                    </a:solidFill>
+                                    <a:latin typeface="Cambria Math" panose="02040503050406030204" pitchFamily="18" charset="0"/>
+                                    <a:cs typeface="Calibri" panose="020F0502020204030204" pitchFamily="34" charset="0"/>
+                                  </a:rPr>
                                   <m:t>0.37</m:t>
                                 </m:r>
                               </m:e>
                               <m:e>
+                                <m:r>
+                                  <a:rPr lang="es-ES" sz="2000" b="0" i="1" smtClean="0">
+                                    <a:solidFill>
+                                      <a:schemeClr val="bg1"/>
+                                    </a:solidFill>
+                                    <a:latin typeface="Cambria Math" panose="02040503050406030204" pitchFamily="18" charset="0"/>
+                                    <a:cs typeface="Calibri" panose="020F0502020204030204" pitchFamily="34" charset="0"/>
+                                  </a:rPr>
+                                  <m:t>   </m:t>
+                                </m:r>
                                 <m:r>
                                   <a:rPr lang="es-ES" sz="2000" b="0" i="1" smtClean="0">
                                     <a:solidFill>
@@ -12809,6 +12909,16 @@
                                     <a:latin typeface="Cambria Math" panose="02040503050406030204" pitchFamily="18" charset="0"/>
                                     <a:cs typeface="Calibri" panose="020F0502020204030204" pitchFamily="34" charset="0"/>
                                   </a:rPr>
+                                  <m:t>    </m:t>
+                                </m:r>
+                                <m:r>
+                                  <a:rPr lang="es-ES" sz="2000" b="0" i="1" smtClean="0">
+                                    <a:solidFill>
+                                      <a:schemeClr val="bg1"/>
+                                    </a:solidFill>
+                                    <a:latin typeface="Cambria Math" panose="02040503050406030204" pitchFamily="18" charset="0"/>
+                                    <a:cs typeface="Calibri" panose="020F0502020204030204" pitchFamily="34" charset="0"/>
+                                  </a:rPr>
                                   <m:t>1</m:t>
                                 </m:r>
                               </m:e>
@@ -12845,7 +12955,31 @@
                     <a:latin typeface="Calibri" panose="020F0502020204030204" pitchFamily="34" charset="0"/>
                     <a:cs typeface="Calibri" panose="020F0502020204030204" pitchFamily="34" charset="0"/>
                   </a:rPr>
-                  <a:t>La correlación entre la primera variable y la tercera es negativa. Esto quiere decir que si observamos un valor por debajo de la media en la primera variable, esperamos que aparezca un valor por encima de la media en la tercera. En la muestra ocurre lo contrario, y esto contribuye a </a:t>
+                  <a:t>La correlación entre la primera variable y la tercera es negativa. </a:t>
+                </a:r>
+              </a:p>
+              <a:p>
+                <a:r>
+                  <a:rPr lang="es-ES" sz="2000" dirty="0">
+                    <a:solidFill>
+                      <a:schemeClr val="bg1"/>
+                    </a:solidFill>
+                    <a:latin typeface="Calibri" panose="020F0502020204030204" pitchFamily="34" charset="0"/>
+                    <a:cs typeface="Calibri" panose="020F0502020204030204" pitchFamily="34" charset="0"/>
+                  </a:rPr>
+                  <a:t>Esto quiere decir que si observamos un valor por debajo de la media en la primera variable, esperamos que aparezca un valor por encima de la media en la tercera. </a:t>
+                </a:r>
+              </a:p>
+              <a:p>
+                <a:r>
+                  <a:rPr lang="es-ES" sz="2000" dirty="0">
+                    <a:solidFill>
+                      <a:schemeClr val="bg1"/>
+                    </a:solidFill>
+                    <a:latin typeface="Calibri" panose="020F0502020204030204" pitchFamily="34" charset="0"/>
+                    <a:cs typeface="Calibri" panose="020F0502020204030204" pitchFamily="34" charset="0"/>
+                  </a:rPr>
+                  <a:t>En la muestra ocurre lo contrario, y esto contribuye a </a:t>
                 </a:r>
                 <a:r>
                   <a:rPr lang="es-ES" sz="2000" dirty="0">
@@ -12871,7 +13005,7 @@
             </p:txBody>
           </p:sp>
         </mc:Choice>
-        <mc:Fallback xmlns="">
+        <mc:Fallback>
           <p:sp>
             <p:nvSpPr>
               <p:cNvPr id="3" name="Marcador de contenido 2">
@@ -12896,7 +13030,7 @@
               <a:blipFill>
                 <a:blip r:embed="rId2"/>
                 <a:stretch>
-                  <a:fillRect l="-279" t="-583" r="-1395"/>
+                  <a:fillRect l="-279" t="-583"/>
                 </a:stretch>
               </a:blipFill>
             </p:spPr>
@@ -14340,8 +14474,8 @@
           </a:p>
         </p:txBody>
       </p:sp>
-      <mc:AlternateContent xmlns:mc="http://schemas.openxmlformats.org/markup-compatibility/2006" xmlns:a14="http://schemas.microsoft.com/office/drawing/2010/main">
-        <mc:Choice Requires="a14">
+      <mc:AlternateContent xmlns:mc="http://schemas.openxmlformats.org/markup-compatibility/2006">
+        <mc:Choice xmlns:a14="http://schemas.microsoft.com/office/drawing/2010/main" Requires="a14">
           <p:sp>
             <p:nvSpPr>
               <p:cNvPr id="3" name="Marcador de contenido 2">
@@ -14396,7 +14530,7 @@
                     <a:latin typeface="Calibri" panose="020F0502020204030204" pitchFamily="34" charset="0"/>
                     <a:cs typeface="Calibri" panose="020F0502020204030204" pitchFamily="34" charset="0"/>
                   </a:rPr>
-                  <a:t>Es decir, tenemos que obtener los estimadores MV de </a:t>
+                  <a:t>Es decir, tenemos que obtener los estimadores MLE de </a:t>
                 </a:r>
                 <a14:m>
                   <m:oMath xmlns:m="http://schemas.openxmlformats.org/officeDocument/2006/math">
@@ -16041,7 +16175,7 @@
             </p:txBody>
           </p:sp>
         </mc:Choice>
-        <mc:Fallback xmlns="">
+        <mc:Fallback>
           <p:sp>
             <p:nvSpPr>
               <p:cNvPr id="3" name="Marcador de contenido 2">
@@ -18231,8 +18365,8 @@
           </a:p>
         </p:txBody>
       </p:sp>
-      <mc:AlternateContent xmlns:mc="http://schemas.openxmlformats.org/markup-compatibility/2006" xmlns:a14="http://schemas.microsoft.com/office/drawing/2010/main">
-        <mc:Choice Requires="a14">
+      <mc:AlternateContent xmlns:mc="http://schemas.openxmlformats.org/markup-compatibility/2006">
+        <mc:Choice xmlns:a14="http://schemas.microsoft.com/office/drawing/2010/main" Requires="a14">
           <p:sp>
             <p:nvSpPr>
               <p:cNvPr id="3" name="Marcador de contenido 2">
@@ -18345,7 +18479,7 @@
                     <m:r>
                       <a:rPr lang="es-ES" sz="2000" i="1" dirty="0" smtClean="0">
                         <a:solidFill>
-                          <a:schemeClr val="bg1"/>
+                          <a:srgbClr val="FFC000"/>
                         </a:solidFill>
                         <a:latin typeface="Cambria Math" panose="02040503050406030204" pitchFamily="18" charset="0"/>
                         <a:cs typeface="Calibri" panose="020F0502020204030204" pitchFamily="34" charset="0"/>
@@ -18357,12 +18491,22 @@
                 <a:r>
                   <a:rPr lang="es-ES" sz="2000" dirty="0">
                     <a:solidFill>
+                      <a:srgbClr val="FFC000"/>
+                    </a:solidFill>
+                    <a:latin typeface="Calibri" panose="020F0502020204030204" pitchFamily="34" charset="0"/>
+                    <a:cs typeface="Calibri" panose="020F0502020204030204" pitchFamily="34" charset="0"/>
+                  </a:rPr>
+                  <a:t> sea suficientemente pequeño</a:t>
+                </a:r>
+                <a:r>
+                  <a:rPr lang="es-ES" sz="2000" dirty="0">
+                    <a:solidFill>
                       <a:schemeClr val="bg1"/>
                     </a:solidFill>
                     <a:latin typeface="Calibri" panose="020F0502020204030204" pitchFamily="34" charset="0"/>
                     <a:cs typeface="Calibri" panose="020F0502020204030204" pitchFamily="34" charset="0"/>
                   </a:rPr>
-                  <a:t> sea suficientemente pequeño. </a:t>
+                  <a:t>. </a:t>
                 </a:r>
               </a:p>
               <a:p>
@@ -18463,9 +18607,9 @@
                 <a14:m>
                   <m:oMath xmlns:m="http://schemas.openxmlformats.org/officeDocument/2006/math">
                     <m:r>
-                      <a:rPr lang="es-ES" sz="2000" i="1">
+                      <a:rPr lang="es-ES" sz="2000" i="1" smtClean="0">
                         <a:solidFill>
-                          <a:schemeClr val="bg1"/>
+                          <a:srgbClr val="92D050"/>
                         </a:solidFill>
                         <a:latin typeface="Cambria Math" panose="02040503050406030204" pitchFamily="18" charset="0"/>
                         <a:cs typeface="Calibri" panose="020F0502020204030204" pitchFamily="34" charset="0"/>
@@ -18477,12 +18621,22 @@
                 <a:r>
                   <a:rPr lang="es-ES" sz="2000" dirty="0">
                     <a:solidFill>
+                      <a:srgbClr val="92D050"/>
+                    </a:solidFill>
+                    <a:latin typeface="Calibri" panose="020F0502020204030204" pitchFamily="34" charset="0"/>
+                    <a:cs typeface="Calibri" panose="020F0502020204030204" pitchFamily="34" charset="0"/>
+                  </a:rPr>
+                  <a:t> es suficientemente grande</a:t>
+                </a:r>
+                <a:r>
+                  <a:rPr lang="es-ES" sz="2000" dirty="0">
+                    <a:solidFill>
                       <a:schemeClr val="bg1"/>
                     </a:solidFill>
                     <a:latin typeface="Calibri" panose="020F0502020204030204" pitchFamily="34" charset="0"/>
                     <a:cs typeface="Calibri" panose="020F0502020204030204" pitchFamily="34" charset="0"/>
                   </a:rPr>
-                  <a:t> es suficientemente grande, es decir, cuando el soporte de los datos para </a:t>
+                  <a:t>, es decir, cuando el soporte de los datos para </a:t>
                 </a:r>
                 <a14:m>
                   <m:oMath xmlns:m="http://schemas.openxmlformats.org/officeDocument/2006/math">
@@ -19229,7 +19383,7 @@
             </p:txBody>
           </p:sp>
         </mc:Choice>
-        <mc:Fallback xmlns="">
+        <mc:Fallback>
           <p:sp>
             <p:nvSpPr>
               <p:cNvPr id="3" name="Marcador de contenido 2">
@@ -19470,6 +19624,15 @@
                 </a:r>
               </a:p>
               <a:p>
+                <a:endParaRPr lang="es-ES" sz="2000" dirty="0">
+                  <a:solidFill>
+                    <a:schemeClr val="bg1"/>
+                  </a:solidFill>
+                  <a:latin typeface="Calibri" panose="020F0502020204030204" pitchFamily="34" charset="0"/>
+                  <a:cs typeface="Calibri" panose="020F0502020204030204" pitchFamily="34" charset="0"/>
+                </a:endParaRPr>
+              </a:p>
+              <a:p>
                 <a:r>
                   <a:rPr lang="es-ES" sz="2000" dirty="0">
                     <a:solidFill>
@@ -19478,7 +19641,17 @@
                     <a:latin typeface="Calibri" panose="020F0502020204030204" pitchFamily="34" charset="0"/>
                     <a:cs typeface="Calibri" panose="020F0502020204030204" pitchFamily="34" charset="0"/>
                   </a:rPr>
-                  <a:t>La dimensión del espacio paramétrico bajo </a:t>
+                  <a:t>La </a:t>
+                </a:r>
+                <a:r>
+                  <a:rPr lang="es-ES" sz="2000" dirty="0">
+                    <a:solidFill>
+                      <a:srgbClr val="92D050"/>
+                    </a:solidFill>
+                    <a:latin typeface="Calibri" panose="020F0502020204030204" pitchFamily="34" charset="0"/>
+                    <a:cs typeface="Calibri" panose="020F0502020204030204" pitchFamily="34" charset="0"/>
+                  </a:rPr>
+                  <a:t>dimensión del espacio paramétrico bajo </a:t>
                 </a:r>
                 <a14:m>
                   <m:oMath xmlns:m="http://schemas.openxmlformats.org/officeDocument/2006/math">
@@ -19487,7 +19660,7 @@
                         <m:ctrlPr>
                           <a:rPr lang="es-ES" sz="2000" i="1">
                             <a:solidFill>
-                              <a:schemeClr val="bg1"/>
+                              <a:srgbClr val="92D050"/>
                             </a:solidFill>
                             <a:latin typeface="Cambria Math" panose="02040503050406030204" pitchFamily="18" charset="0"/>
                             <a:cs typeface="Calibri" panose="020F0502020204030204" pitchFamily="34" charset="0"/>
@@ -19498,7 +19671,7 @@
                         <m:r>
                           <a:rPr lang="es-ES" sz="2000" i="1">
                             <a:solidFill>
-                              <a:schemeClr val="bg1"/>
+                              <a:srgbClr val="92D050"/>
                             </a:solidFill>
                             <a:latin typeface="Cambria Math" panose="02040503050406030204" pitchFamily="18" charset="0"/>
                             <a:cs typeface="Calibri" panose="020F0502020204030204" pitchFamily="34" charset="0"/>
@@ -19510,7 +19683,7 @@
                         <m:r>
                           <a:rPr lang="es-ES" sz="2000" i="1">
                             <a:solidFill>
-                              <a:schemeClr val="bg1"/>
+                              <a:srgbClr val="92D050"/>
                             </a:solidFill>
                             <a:latin typeface="Cambria Math" panose="02040503050406030204" pitchFamily="18" charset="0"/>
                             <a:cs typeface="Calibri" panose="020F0502020204030204" pitchFamily="34" charset="0"/>
@@ -19705,6 +19878,18 @@
                 </a:r>
               </a:p>
               <a:p>
+                <a:pPr marL="0" indent="0">
+                  <a:buNone/>
+                </a:pPr>
+                <a:endParaRPr lang="es-ES" sz="2000" dirty="0">
+                  <a:solidFill>
+                    <a:schemeClr val="bg1"/>
+                  </a:solidFill>
+                  <a:latin typeface="Calibri" panose="020F0502020204030204" pitchFamily="34" charset="0"/>
+                  <a:cs typeface="Calibri" panose="020F0502020204030204" pitchFamily="34" charset="0"/>
+                </a:endParaRPr>
+              </a:p>
+              <a:p>
                 <a:r>
                   <a:rPr lang="es-ES" sz="2000" dirty="0">
                     <a:solidFill>
@@ -19713,7 +19898,17 @@
                     <a:latin typeface="Calibri" panose="020F0502020204030204" pitchFamily="34" charset="0"/>
                     <a:cs typeface="Calibri" panose="020F0502020204030204" pitchFamily="34" charset="0"/>
                   </a:rPr>
-                  <a:t>La dimensión del espacio paramétrico bajo </a:t>
+                  <a:t>La </a:t>
+                </a:r>
+                <a:r>
+                  <a:rPr lang="es-ES" sz="2000" dirty="0">
+                    <a:solidFill>
+                      <a:srgbClr val="FFC000"/>
+                    </a:solidFill>
+                    <a:latin typeface="Calibri" panose="020F0502020204030204" pitchFamily="34" charset="0"/>
+                    <a:cs typeface="Calibri" panose="020F0502020204030204" pitchFamily="34" charset="0"/>
+                  </a:rPr>
+                  <a:t>dimensión del espacio paramétrico bajo </a:t>
                 </a:r>
                 <a14:m>
                   <m:oMath xmlns:m="http://schemas.openxmlformats.org/officeDocument/2006/math">
@@ -19722,7 +19917,7 @@
                         <m:ctrlPr>
                           <a:rPr lang="es-ES" sz="2000" i="1">
                             <a:solidFill>
-                              <a:schemeClr val="bg1"/>
+                              <a:srgbClr val="FFC000"/>
                             </a:solidFill>
                             <a:latin typeface="Cambria Math" panose="02040503050406030204" pitchFamily="18" charset="0"/>
                             <a:cs typeface="Calibri" panose="020F0502020204030204" pitchFamily="34" charset="0"/>
@@ -19733,7 +19928,7 @@
                         <m:r>
                           <a:rPr lang="es-ES" sz="2000" i="1">
                             <a:solidFill>
-                              <a:schemeClr val="bg1"/>
+                              <a:srgbClr val="FFC000"/>
                             </a:solidFill>
                             <a:latin typeface="Cambria Math" panose="02040503050406030204" pitchFamily="18" charset="0"/>
                             <a:cs typeface="Calibri" panose="020F0502020204030204" pitchFamily="34" charset="0"/>
@@ -19745,7 +19940,7 @@
                         <m:r>
                           <a:rPr lang="es-ES" sz="2000" i="1">
                             <a:solidFill>
-                              <a:schemeClr val="bg1"/>
+                              <a:srgbClr val="FFC000"/>
                             </a:solidFill>
                             <a:latin typeface="Cambria Math" panose="02040503050406030204" pitchFamily="18" charset="0"/>
                             <a:cs typeface="Calibri" panose="020F0502020204030204" pitchFamily="34" charset="0"/>
@@ -19857,14 +20052,24 @@
                     <a:latin typeface="Calibri" panose="020F0502020204030204" pitchFamily="34" charset="0"/>
                     <a:cs typeface="Calibri" panose="020F0502020204030204" pitchFamily="34" charset="0"/>
                   </a:rPr>
-                  <a:t>La diferencia es </a:t>
+                  <a:t>La </a:t>
+                </a:r>
+                <a:r>
+                  <a:rPr lang="es-ES" sz="2000" dirty="0">
+                    <a:solidFill>
+                      <a:srgbClr val="00B0F0"/>
+                    </a:solidFill>
+                    <a:latin typeface="Calibri" panose="020F0502020204030204" pitchFamily="34" charset="0"/>
+                    <a:cs typeface="Calibri" panose="020F0502020204030204" pitchFamily="34" charset="0"/>
+                  </a:rPr>
+                  <a:t>diferencia es </a:t>
                 </a:r>
                 <a14:m>
                   <m:oMath xmlns:m="http://schemas.openxmlformats.org/officeDocument/2006/math">
                     <m:r>
                       <a:rPr lang="es-ES" sz="2000" i="1" dirty="0">
                         <a:solidFill>
-                          <a:schemeClr val="bg1"/>
+                          <a:srgbClr val="00B0F0"/>
                         </a:solidFill>
                         <a:latin typeface="Cambria Math" panose="02040503050406030204" pitchFamily="18" charset="0"/>
                         <a:cs typeface="Calibri" panose="020F0502020204030204" pitchFamily="34" charset="0"/>
@@ -20051,8 +20256,8 @@
           </a:p>
         </p:txBody>
       </p:sp>
-      <mc:AlternateContent xmlns:mc="http://schemas.openxmlformats.org/markup-compatibility/2006" xmlns:a14="http://schemas.microsoft.com/office/drawing/2010/main">
-        <mc:Choice Requires="a14">
+      <mc:AlternateContent xmlns:mc="http://schemas.openxmlformats.org/markup-compatibility/2006">
+        <mc:Choice xmlns:a14="http://schemas.microsoft.com/office/drawing/2010/main" Requires="a14">
           <p:sp>
             <p:nvSpPr>
               <p:cNvPr id="3" name="Marcador de contenido 2">
@@ -20431,9 +20636,9 @@
                     <m:sSup>
                       <m:sSupPr>
                         <m:ctrlPr>
-                          <a:rPr lang="es-ES" sz="2000" i="1">
+                          <a:rPr lang="es-ES" sz="2000" i="1" smtClean="0">
                             <a:solidFill>
-                              <a:schemeClr val="bg1"/>
+                              <a:srgbClr val="00B0F0"/>
                             </a:solidFill>
                             <a:latin typeface="Cambria Math" panose="02040503050406030204" pitchFamily="18" charset="0"/>
                             <a:cs typeface="Calibri" panose="020F0502020204030204" pitchFamily="34" charset="0"/>
@@ -20444,7 +20649,7 @@
                         <m:r>
                           <a:rPr lang="es-ES" sz="2000" i="1">
                             <a:solidFill>
-                              <a:schemeClr val="bg1"/>
+                              <a:srgbClr val="00B0F0"/>
                             </a:solidFill>
                             <a:latin typeface="Cambria Math" panose="02040503050406030204" pitchFamily="18" charset="0"/>
                             <a:cs typeface="Calibri" panose="020F0502020204030204" pitchFamily="34" charset="0"/>
@@ -20456,7 +20661,7 @@
                         <m:r>
                           <a:rPr lang="es-ES" sz="2000" i="1">
                             <a:solidFill>
-                              <a:schemeClr val="bg1"/>
+                              <a:srgbClr val="00B0F0"/>
                             </a:solidFill>
                             <a:latin typeface="Cambria Math" panose="02040503050406030204" pitchFamily="18" charset="0"/>
                             <a:cs typeface="Calibri" panose="020F0502020204030204" pitchFamily="34" charset="0"/>
@@ -20468,7 +20673,7 @@
                     <m:r>
                       <a:rPr lang="es-ES" sz="2000" b="0" i="1" smtClean="0">
                         <a:solidFill>
-                          <a:schemeClr val="bg1"/>
+                          <a:srgbClr val="00B0F0"/>
                         </a:solidFill>
                         <a:latin typeface="Cambria Math" panose="02040503050406030204" pitchFamily="18" charset="0"/>
                         <a:cs typeface="Calibri" panose="020F0502020204030204" pitchFamily="34" charset="0"/>
@@ -20480,7 +20685,7 @@
                         <m:ctrlPr>
                           <a:rPr lang="es-ES" sz="2000" b="0" i="1" smtClean="0">
                             <a:solidFill>
-                              <a:schemeClr val="bg1"/>
+                              <a:srgbClr val="00B0F0"/>
                             </a:solidFill>
                             <a:latin typeface="Cambria Math" panose="02040503050406030204" pitchFamily="18" charset="0"/>
                             <a:cs typeface="Calibri" panose="020F0502020204030204" pitchFamily="34" charset="0"/>
@@ -20491,7 +20696,7 @@
                         <m:r>
                           <a:rPr lang="es-ES" sz="2000" b="0" i="1" smtClean="0">
                             <a:solidFill>
-                              <a:schemeClr val="bg1"/>
+                              <a:srgbClr val="00B0F0"/>
                             </a:solidFill>
                             <a:latin typeface="Cambria Math" panose="02040503050406030204" pitchFamily="18" charset="0"/>
                             <a:cs typeface="Calibri" panose="020F0502020204030204" pitchFamily="34" charset="0"/>
@@ -20501,7 +20706,7 @@
                         <m:r>
                           <a:rPr lang="es-ES" sz="2000" b="0" i="1" smtClean="0">
                             <a:solidFill>
-                              <a:schemeClr val="bg1"/>
+                              <a:srgbClr val="00B0F0"/>
                             </a:solidFill>
                             <a:latin typeface="Cambria Math" panose="02040503050406030204" pitchFamily="18" charset="0"/>
                             <a:cs typeface="Calibri" panose="020F0502020204030204" pitchFamily="34" charset="0"/>
@@ -20515,7 +20720,7 @@
                         <m:ctrlPr>
                           <a:rPr lang="es-ES" sz="2000" b="0" i="1" smtClean="0">
                             <a:solidFill>
-                              <a:schemeClr val="bg1"/>
+                              <a:srgbClr val="00B0F0"/>
                             </a:solidFill>
                             <a:latin typeface="Cambria Math" panose="02040503050406030204" pitchFamily="18" charset="0"/>
                             <a:cs typeface="Calibri" panose="020F0502020204030204" pitchFamily="34" charset="0"/>
@@ -20528,7 +20733,7 @@
                             <m:ctrlPr>
                               <a:rPr lang="es-ES" sz="2000" b="0" i="1" smtClean="0">
                                 <a:solidFill>
-                                  <a:schemeClr val="bg1"/>
+                                  <a:srgbClr val="00B0F0"/>
                                 </a:solidFill>
                                 <a:latin typeface="Cambria Math" panose="02040503050406030204" pitchFamily="18" charset="0"/>
                                 <a:cs typeface="Calibri" panose="020F0502020204030204" pitchFamily="34" charset="0"/>
@@ -20542,7 +20747,7 @@
                                 <m:ctrlPr>
                                   <a:rPr lang="es-ES" sz="2000" b="1" i="1" smtClean="0">
                                     <a:solidFill>
-                                      <a:schemeClr val="bg1"/>
+                                      <a:srgbClr val="00B0F0"/>
                                     </a:solidFill>
                                     <a:latin typeface="Cambria Math" panose="02040503050406030204" pitchFamily="18" charset="0"/>
                                     <a:cs typeface="Calibri" panose="020F0502020204030204" pitchFamily="34" charset="0"/>
@@ -20553,7 +20758,7 @@
                                 <m:r>
                                   <a:rPr lang="es-ES" sz="2000" b="1" i="0" smtClean="0">
                                     <a:solidFill>
-                                      <a:schemeClr val="bg1"/>
+                                      <a:srgbClr val="00B0F0"/>
                                     </a:solidFill>
                                     <a:latin typeface="Cambria Math" panose="02040503050406030204" pitchFamily="18" charset="0"/>
                                     <a:cs typeface="Calibri" panose="020F0502020204030204" pitchFamily="34" charset="0"/>
@@ -20565,7 +20770,7 @@
                             <m:r>
                               <a:rPr lang="es-ES" sz="2000" b="0" i="1" smtClean="0">
                                 <a:solidFill>
-                                  <a:schemeClr val="bg1"/>
+                                  <a:srgbClr val="00B0F0"/>
                                 </a:solidFill>
                                 <a:latin typeface="Cambria Math" panose="02040503050406030204" pitchFamily="18" charset="0"/>
                                 <a:cs typeface="Calibri" panose="020F0502020204030204" pitchFamily="34" charset="0"/>
@@ -20575,7 +20780,7 @@
                             <m:r>
                               <a:rPr lang="es-ES" sz="2000" b="1" i="1" smtClean="0">
                                 <a:solidFill>
-                                  <a:schemeClr val="bg1"/>
+                                  <a:srgbClr val="00B0F0"/>
                                 </a:solidFill>
                                 <a:latin typeface="Cambria Math" panose="02040503050406030204" pitchFamily="18" charset="0"/>
                                 <a:cs typeface="Calibri" panose="020F0502020204030204" pitchFamily="34" charset="0"/>
@@ -20589,7 +20794,7 @@
                         <m:r>
                           <a:rPr lang="es-ES" sz="2000" b="0" i="1" smtClean="0">
                             <a:solidFill>
-                              <a:schemeClr val="bg1"/>
+                              <a:srgbClr val="00B0F0"/>
                             </a:solidFill>
                             <a:latin typeface="Cambria Math" panose="02040503050406030204" pitchFamily="18" charset="0"/>
                             <a:cs typeface="Calibri" panose="020F0502020204030204" pitchFamily="34" charset="0"/>
@@ -20603,7 +20808,7 @@
                         <m:ctrlPr>
                           <a:rPr lang="es-ES" sz="2000" b="0" i="1" smtClean="0">
                             <a:solidFill>
-                              <a:schemeClr val="bg1"/>
+                              <a:srgbClr val="00B0F0"/>
                             </a:solidFill>
                             <a:latin typeface="Cambria Math" panose="02040503050406030204" pitchFamily="18" charset="0"/>
                             <a:cs typeface="Calibri" panose="020F0502020204030204" pitchFamily="34" charset="0"/>
@@ -20614,7 +20819,7 @@
                         <m:r>
                           <a:rPr lang="es-ES" sz="2000" b="0" i="1" smtClean="0">
                             <a:solidFill>
-                              <a:schemeClr val="bg1"/>
+                              <a:srgbClr val="00B0F0"/>
                             </a:solidFill>
                             <a:latin typeface="Cambria Math" panose="02040503050406030204" pitchFamily="18" charset="0"/>
                             <a:cs typeface="Calibri" panose="020F0502020204030204" pitchFamily="34" charset="0"/>
@@ -20626,7 +20831,7 @@
                         <m:r>
                           <a:rPr lang="es-ES" sz="2000" b="0" i="1" smtClean="0">
                             <a:solidFill>
-                              <a:schemeClr val="bg1"/>
+                              <a:srgbClr val="00B0F0"/>
                             </a:solidFill>
                             <a:latin typeface="Cambria Math" panose="02040503050406030204" pitchFamily="18" charset="0"/>
                             <a:cs typeface="Calibri" panose="020F0502020204030204" pitchFamily="34" charset="0"/>
@@ -20640,7 +20845,7 @@
                         <m:ctrlPr>
                           <a:rPr lang="es-ES" sz="2000" b="0" i="1" smtClean="0">
                             <a:solidFill>
-                              <a:schemeClr val="bg1"/>
+                              <a:srgbClr val="00B0F0"/>
                             </a:solidFill>
                             <a:latin typeface="Cambria Math" panose="02040503050406030204" pitchFamily="18" charset="0"/>
                             <a:cs typeface="Calibri" panose="020F0502020204030204" pitchFamily="34" charset="0"/>
@@ -20654,7 +20859,7 @@
                             <m:ctrlPr>
                               <a:rPr lang="es-ES" sz="2000" b="1" i="1">
                                 <a:solidFill>
-                                  <a:schemeClr val="bg1"/>
+                                  <a:srgbClr val="00B0F0"/>
                                 </a:solidFill>
                                 <a:latin typeface="Cambria Math" panose="02040503050406030204" pitchFamily="18" charset="0"/>
                                 <a:cs typeface="Calibri" panose="020F0502020204030204" pitchFamily="34" charset="0"/>
@@ -20665,7 +20870,7 @@
                             <m:r>
                               <a:rPr lang="es-ES" sz="2000" b="1">
                                 <a:solidFill>
-                                  <a:schemeClr val="bg1"/>
+                                  <a:srgbClr val="00B0F0"/>
                                 </a:solidFill>
                                 <a:latin typeface="Cambria Math" panose="02040503050406030204" pitchFamily="18" charset="0"/>
                                 <a:cs typeface="Calibri" panose="020F0502020204030204" pitchFamily="34" charset="0"/>
@@ -20677,7 +20882,7 @@
                         <m:r>
                           <a:rPr lang="es-ES" sz="2000" i="1">
                             <a:solidFill>
-                              <a:schemeClr val="bg1"/>
+                              <a:srgbClr val="00B0F0"/>
                             </a:solidFill>
                             <a:latin typeface="Cambria Math" panose="02040503050406030204" pitchFamily="18" charset="0"/>
                             <a:cs typeface="Calibri" panose="020F0502020204030204" pitchFamily="34" charset="0"/>
@@ -20687,7 +20892,7 @@
                         <m:r>
                           <a:rPr lang="es-ES" sz="2000" b="1" i="1">
                             <a:solidFill>
-                              <a:schemeClr val="bg1"/>
+                              <a:srgbClr val="00B0F0"/>
                             </a:solidFill>
                             <a:latin typeface="Cambria Math" panose="02040503050406030204" pitchFamily="18" charset="0"/>
                             <a:cs typeface="Calibri" panose="020F0502020204030204" pitchFamily="34" charset="0"/>
@@ -20701,12 +20906,22 @@
                 <a:r>
                   <a:rPr lang="es-ES" sz="2000" dirty="0">
                     <a:solidFill>
+                      <a:srgbClr val="00B0F0"/>
+                    </a:solidFill>
+                    <a:latin typeface="Calibri" panose="020F0502020204030204" pitchFamily="34" charset="0"/>
+                    <a:cs typeface="Calibri" panose="020F0502020204030204" pitchFamily="34" charset="0"/>
+                  </a:rPr>
+                  <a:t> </a:t>
+                </a:r>
+                <a:r>
+                  <a:rPr lang="es-ES" sz="2000" dirty="0">
+                    <a:solidFill>
                       <a:schemeClr val="bg1"/>
                     </a:solidFill>
                     <a:latin typeface="Calibri" panose="020F0502020204030204" pitchFamily="34" charset="0"/>
                     <a:cs typeface="Calibri" panose="020F0502020204030204" pitchFamily="34" charset="0"/>
                   </a:rPr>
-                  <a:t> sigue una distribución llamada </a:t>
+                  <a:t>sigue una distribución llamada </a:t>
                 </a:r>
                 <a14:m>
                   <m:oMath xmlns:m="http://schemas.openxmlformats.org/officeDocument/2006/math">
@@ -20959,7 +21174,7 @@
             </p:txBody>
           </p:sp>
         </mc:Choice>
-        <mc:Fallback xmlns="">
+        <mc:Fallback>
           <p:sp>
             <p:nvSpPr>
               <p:cNvPr id="3" name="Marcador de contenido 2">

</xml_diff>